<commit_message>
added discussion of Sirepo
</commit_message>
<xml_diff>
--- a/gui/03_GUI.pptx
+++ b/gui/03_GUI.pptx
@@ -5,7 +5,7 @@
     <p:sldMasterId id="2147483696" r:id="rId1"/>
   </p:sldMasterIdLst>
   <p:notesMasterIdLst>
-    <p:notesMasterId r:id="rId13"/>
+    <p:notesMasterId r:id="rId17"/>
   </p:notesMasterIdLst>
   <p:sldIdLst>
     <p:sldId id="297" r:id="rId2"/>
@@ -18,7 +18,11 @@
     <p:sldId id="430" r:id="rId9"/>
     <p:sldId id="436" r:id="rId10"/>
     <p:sldId id="437" r:id="rId11"/>
-    <p:sldId id="424" r:id="rId12"/>
+    <p:sldId id="438" r:id="rId12"/>
+    <p:sldId id="439" r:id="rId13"/>
+    <p:sldId id="440" r:id="rId14"/>
+    <p:sldId id="441" r:id="rId15"/>
+    <p:sldId id="424" r:id="rId16"/>
   </p:sldIdLst>
   <p:sldSz cx="9144000" cy="6858000" type="screen4x3"/>
   <p:notesSz cx="6858000" cy="9144000"/>
@@ -735,6 +739,342 @@
             <a:fld id="{4E0E9D85-81CD-44C8-8F15-3AA06C34AF8C}" type="slidenum">
               <a:rPr lang="en-US" smtClean="0"/>
               <a:t>11</a:t>
+            </a:fld>
+            <a:endParaRPr lang="en-US"/>
+          </a:p>
+        </p:txBody>
+      </p:sp>
+    </p:spTree>
+    <p:extLst>
+      <p:ext uri="{BB962C8B-B14F-4D97-AF65-F5344CB8AC3E}">
+        <p14:creationId xmlns:p14="http://schemas.microsoft.com/office/powerpoint/2010/main" val="2945432634"/>
+      </p:ext>
+    </p:extLst>
+  </p:cSld>
+  <p:clrMapOvr>
+    <a:masterClrMapping/>
+  </p:clrMapOvr>
+</p:notes>
+</file>
+
+<file path=ppt/notesSlides/notesSlide12.xml><?xml version="1.0" encoding="utf-8"?>
+<p:notes xmlns:a="http://schemas.openxmlformats.org/drawingml/2006/main" xmlns:r="http://schemas.openxmlformats.org/officeDocument/2006/relationships" xmlns:p="http://schemas.openxmlformats.org/presentationml/2006/main">
+  <p:cSld>
+    <p:spTree>
+      <p:nvGrpSpPr>
+        <p:cNvPr id="1" name=""/>
+        <p:cNvGrpSpPr/>
+        <p:nvPr/>
+      </p:nvGrpSpPr>
+      <p:grpSpPr>
+        <a:xfrm>
+          <a:off x="0" y="0"/>
+          <a:ext cx="0" cy="0"/>
+          <a:chOff x="0" y="0"/>
+          <a:chExt cx="0" cy="0"/>
+        </a:xfrm>
+      </p:grpSpPr>
+      <p:sp>
+        <p:nvSpPr>
+          <p:cNvPr id="2" name="Slide Image Placeholder 1"/>
+          <p:cNvSpPr>
+            <a:spLocks noGrp="1" noRot="1" noChangeAspect="1"/>
+          </p:cNvSpPr>
+          <p:nvPr>
+            <p:ph type="sldImg"/>
+          </p:nvPr>
+        </p:nvSpPr>
+        <p:spPr/>
+      </p:sp>
+      <p:sp>
+        <p:nvSpPr>
+          <p:cNvPr id="3" name="Notes Placeholder 2"/>
+          <p:cNvSpPr>
+            <a:spLocks noGrp="1"/>
+          </p:cNvSpPr>
+          <p:nvPr>
+            <p:ph type="body" idx="1"/>
+          </p:nvPr>
+        </p:nvSpPr>
+        <p:spPr/>
+        <p:txBody>
+          <a:bodyPr/>
+          <a:lstStyle/>
+          <a:p>
+            <a:endParaRPr lang="en-US"/>
+          </a:p>
+        </p:txBody>
+      </p:sp>
+      <p:sp>
+        <p:nvSpPr>
+          <p:cNvPr id="4" name="Slide Number Placeholder 3"/>
+          <p:cNvSpPr>
+            <a:spLocks noGrp="1"/>
+          </p:cNvSpPr>
+          <p:nvPr>
+            <p:ph type="sldNum" sz="quarter" idx="10"/>
+          </p:nvPr>
+        </p:nvSpPr>
+        <p:spPr/>
+        <p:txBody>
+          <a:bodyPr/>
+          <a:lstStyle/>
+          <a:p>
+            <a:fld id="{4E0E9D85-81CD-44C8-8F15-3AA06C34AF8C}" type="slidenum">
+              <a:rPr lang="en-US" smtClean="0"/>
+              <a:t>12</a:t>
+            </a:fld>
+            <a:endParaRPr lang="en-US"/>
+          </a:p>
+        </p:txBody>
+      </p:sp>
+    </p:spTree>
+    <p:extLst>
+      <p:ext uri="{BB962C8B-B14F-4D97-AF65-F5344CB8AC3E}">
+        <p14:creationId xmlns:p14="http://schemas.microsoft.com/office/powerpoint/2010/main" val="3636968840"/>
+      </p:ext>
+    </p:extLst>
+  </p:cSld>
+  <p:clrMapOvr>
+    <a:masterClrMapping/>
+  </p:clrMapOvr>
+</p:notes>
+</file>
+
+<file path=ppt/notesSlides/notesSlide13.xml><?xml version="1.0" encoding="utf-8"?>
+<p:notes xmlns:a="http://schemas.openxmlformats.org/drawingml/2006/main" xmlns:r="http://schemas.openxmlformats.org/officeDocument/2006/relationships" xmlns:p="http://schemas.openxmlformats.org/presentationml/2006/main">
+  <p:cSld>
+    <p:spTree>
+      <p:nvGrpSpPr>
+        <p:cNvPr id="1" name=""/>
+        <p:cNvGrpSpPr/>
+        <p:nvPr/>
+      </p:nvGrpSpPr>
+      <p:grpSpPr>
+        <a:xfrm>
+          <a:off x="0" y="0"/>
+          <a:ext cx="0" cy="0"/>
+          <a:chOff x="0" y="0"/>
+          <a:chExt cx="0" cy="0"/>
+        </a:xfrm>
+      </p:grpSpPr>
+      <p:sp>
+        <p:nvSpPr>
+          <p:cNvPr id="2" name="Slide Image Placeholder 1"/>
+          <p:cNvSpPr>
+            <a:spLocks noGrp="1" noRot="1" noChangeAspect="1"/>
+          </p:cNvSpPr>
+          <p:nvPr>
+            <p:ph type="sldImg"/>
+          </p:nvPr>
+        </p:nvSpPr>
+        <p:spPr/>
+      </p:sp>
+      <p:sp>
+        <p:nvSpPr>
+          <p:cNvPr id="3" name="Notes Placeholder 2"/>
+          <p:cNvSpPr>
+            <a:spLocks noGrp="1"/>
+          </p:cNvSpPr>
+          <p:nvPr>
+            <p:ph type="body" idx="1"/>
+          </p:nvPr>
+        </p:nvSpPr>
+        <p:spPr/>
+        <p:txBody>
+          <a:bodyPr/>
+          <a:lstStyle/>
+          <a:p>
+            <a:endParaRPr lang="en-US"/>
+          </a:p>
+        </p:txBody>
+      </p:sp>
+      <p:sp>
+        <p:nvSpPr>
+          <p:cNvPr id="4" name="Slide Number Placeholder 3"/>
+          <p:cNvSpPr>
+            <a:spLocks noGrp="1"/>
+          </p:cNvSpPr>
+          <p:nvPr>
+            <p:ph type="sldNum" sz="quarter" idx="10"/>
+          </p:nvPr>
+        </p:nvSpPr>
+        <p:spPr/>
+        <p:txBody>
+          <a:bodyPr/>
+          <a:lstStyle/>
+          <a:p>
+            <a:fld id="{4E0E9D85-81CD-44C8-8F15-3AA06C34AF8C}" type="slidenum">
+              <a:rPr lang="en-US" smtClean="0"/>
+              <a:t>13</a:t>
+            </a:fld>
+            <a:endParaRPr lang="en-US"/>
+          </a:p>
+        </p:txBody>
+      </p:sp>
+    </p:spTree>
+    <p:extLst>
+      <p:ext uri="{BB962C8B-B14F-4D97-AF65-F5344CB8AC3E}">
+        <p14:creationId xmlns:p14="http://schemas.microsoft.com/office/powerpoint/2010/main" val="664498280"/>
+      </p:ext>
+    </p:extLst>
+  </p:cSld>
+  <p:clrMapOvr>
+    <a:masterClrMapping/>
+  </p:clrMapOvr>
+</p:notes>
+</file>
+
+<file path=ppt/notesSlides/notesSlide14.xml><?xml version="1.0" encoding="utf-8"?>
+<p:notes xmlns:a="http://schemas.openxmlformats.org/drawingml/2006/main" xmlns:r="http://schemas.openxmlformats.org/officeDocument/2006/relationships" xmlns:p="http://schemas.openxmlformats.org/presentationml/2006/main">
+  <p:cSld>
+    <p:spTree>
+      <p:nvGrpSpPr>
+        <p:cNvPr id="1" name=""/>
+        <p:cNvGrpSpPr/>
+        <p:nvPr/>
+      </p:nvGrpSpPr>
+      <p:grpSpPr>
+        <a:xfrm>
+          <a:off x="0" y="0"/>
+          <a:ext cx="0" cy="0"/>
+          <a:chOff x="0" y="0"/>
+          <a:chExt cx="0" cy="0"/>
+        </a:xfrm>
+      </p:grpSpPr>
+      <p:sp>
+        <p:nvSpPr>
+          <p:cNvPr id="2" name="Slide Image Placeholder 1"/>
+          <p:cNvSpPr>
+            <a:spLocks noGrp="1" noRot="1" noChangeAspect="1"/>
+          </p:cNvSpPr>
+          <p:nvPr>
+            <p:ph type="sldImg"/>
+          </p:nvPr>
+        </p:nvSpPr>
+        <p:spPr/>
+      </p:sp>
+      <p:sp>
+        <p:nvSpPr>
+          <p:cNvPr id="3" name="Notes Placeholder 2"/>
+          <p:cNvSpPr>
+            <a:spLocks noGrp="1"/>
+          </p:cNvSpPr>
+          <p:nvPr>
+            <p:ph type="body" idx="1"/>
+          </p:nvPr>
+        </p:nvSpPr>
+        <p:spPr/>
+        <p:txBody>
+          <a:bodyPr/>
+          <a:lstStyle/>
+          <a:p>
+            <a:endParaRPr lang="en-US"/>
+          </a:p>
+        </p:txBody>
+      </p:sp>
+      <p:sp>
+        <p:nvSpPr>
+          <p:cNvPr id="4" name="Slide Number Placeholder 3"/>
+          <p:cNvSpPr>
+            <a:spLocks noGrp="1"/>
+          </p:cNvSpPr>
+          <p:nvPr>
+            <p:ph type="sldNum" sz="quarter" idx="10"/>
+          </p:nvPr>
+        </p:nvSpPr>
+        <p:spPr/>
+        <p:txBody>
+          <a:bodyPr/>
+          <a:lstStyle/>
+          <a:p>
+            <a:fld id="{4E0E9D85-81CD-44C8-8F15-3AA06C34AF8C}" type="slidenum">
+              <a:rPr lang="en-US" smtClean="0"/>
+              <a:t>14</a:t>
+            </a:fld>
+            <a:endParaRPr lang="en-US"/>
+          </a:p>
+        </p:txBody>
+      </p:sp>
+    </p:spTree>
+    <p:extLst>
+      <p:ext uri="{BB962C8B-B14F-4D97-AF65-F5344CB8AC3E}">
+        <p14:creationId xmlns:p14="http://schemas.microsoft.com/office/powerpoint/2010/main" val="3463410602"/>
+      </p:ext>
+    </p:extLst>
+  </p:cSld>
+  <p:clrMapOvr>
+    <a:masterClrMapping/>
+  </p:clrMapOvr>
+</p:notes>
+</file>
+
+<file path=ppt/notesSlides/notesSlide15.xml><?xml version="1.0" encoding="utf-8"?>
+<p:notes xmlns:a="http://schemas.openxmlformats.org/drawingml/2006/main" xmlns:r="http://schemas.openxmlformats.org/officeDocument/2006/relationships" xmlns:p="http://schemas.openxmlformats.org/presentationml/2006/main">
+  <p:cSld>
+    <p:spTree>
+      <p:nvGrpSpPr>
+        <p:cNvPr id="1" name=""/>
+        <p:cNvGrpSpPr/>
+        <p:nvPr/>
+      </p:nvGrpSpPr>
+      <p:grpSpPr>
+        <a:xfrm>
+          <a:off x="0" y="0"/>
+          <a:ext cx="0" cy="0"/>
+          <a:chOff x="0" y="0"/>
+          <a:chExt cx="0" cy="0"/>
+        </a:xfrm>
+      </p:grpSpPr>
+      <p:sp>
+        <p:nvSpPr>
+          <p:cNvPr id="2" name="Slide Image Placeholder 1"/>
+          <p:cNvSpPr>
+            <a:spLocks noGrp="1" noRot="1" noChangeAspect="1"/>
+          </p:cNvSpPr>
+          <p:nvPr>
+            <p:ph type="sldImg"/>
+          </p:nvPr>
+        </p:nvSpPr>
+        <p:spPr/>
+      </p:sp>
+      <p:sp>
+        <p:nvSpPr>
+          <p:cNvPr id="3" name="Notes Placeholder 2"/>
+          <p:cNvSpPr>
+            <a:spLocks noGrp="1"/>
+          </p:cNvSpPr>
+          <p:nvPr>
+            <p:ph type="body" idx="1"/>
+          </p:nvPr>
+        </p:nvSpPr>
+        <p:spPr/>
+        <p:txBody>
+          <a:bodyPr/>
+          <a:lstStyle/>
+          <a:p>
+            <a:endParaRPr lang="en-US"/>
+          </a:p>
+        </p:txBody>
+      </p:sp>
+      <p:sp>
+        <p:nvSpPr>
+          <p:cNvPr id="4" name="Slide Number Placeholder 3"/>
+          <p:cNvSpPr>
+            <a:spLocks noGrp="1"/>
+          </p:cNvSpPr>
+          <p:nvPr>
+            <p:ph type="sldNum" sz="quarter" idx="10"/>
+          </p:nvPr>
+        </p:nvSpPr>
+        <p:spPr/>
+        <p:txBody>
+          <a:bodyPr/>
+          <a:lstStyle/>
+          <a:p>
+            <a:fld id="{4E0E9D85-81CD-44C8-8F15-3AA06C34AF8C}" type="slidenum">
+              <a:rPr lang="en-US" smtClean="0"/>
+              <a:t>15</a:t>
             </a:fld>
             <a:endParaRPr lang="en-US"/>
           </a:p>
@@ -3907,6 +4247,896 @@
 </file>
 
 <file path=ppt/slides/slide11.xml><?xml version="1.0" encoding="utf-8"?>
+<p:sld xmlns:a="http://schemas.openxmlformats.org/drawingml/2006/main" xmlns:r="http://schemas.openxmlformats.org/officeDocument/2006/relationships" xmlns:p="http://schemas.openxmlformats.org/presentationml/2006/main">
+  <p:cSld>
+    <p:spTree>
+      <p:nvGrpSpPr>
+        <p:cNvPr id="1" name=""/>
+        <p:cNvGrpSpPr/>
+        <p:nvPr/>
+      </p:nvGrpSpPr>
+      <p:grpSpPr>
+        <a:xfrm>
+          <a:off x="0" y="0"/>
+          <a:ext cx="0" cy="0"/>
+          <a:chOff x="0" y="0"/>
+          <a:chExt cx="0" cy="0"/>
+        </a:xfrm>
+      </p:grpSpPr>
+      <p:sp>
+        <p:nvSpPr>
+          <p:cNvPr id="2" name="Title 1"/>
+          <p:cNvSpPr>
+            <a:spLocks noGrp="1"/>
+          </p:cNvSpPr>
+          <p:nvPr>
+            <p:ph type="title"/>
+          </p:nvPr>
+        </p:nvSpPr>
+        <p:spPr>
+          <a:xfrm>
+            <a:off x="0" y="10037"/>
+            <a:ext cx="9144000" cy="589085"/>
+          </a:xfrm>
+        </p:spPr>
+        <p:txBody>
+          <a:bodyPr>
+            <a:normAutofit/>
+          </a:bodyPr>
+          <a:lstStyle/>
+          <a:p>
+            <a:r>
+              <a:rPr lang="en-US" dirty="0"/>
+              <a:t>Sirepo:  in-browser technologies</a:t>
+            </a:r>
+          </a:p>
+        </p:txBody>
+      </p:sp>
+      <p:sp>
+        <p:nvSpPr>
+          <p:cNvPr id="3" name="Content Placeholder 2"/>
+          <p:cNvSpPr>
+            <a:spLocks noGrp="1"/>
+          </p:cNvSpPr>
+          <p:nvPr>
+            <p:ph idx="1"/>
+          </p:nvPr>
+        </p:nvSpPr>
+        <p:spPr>
+          <a:xfrm>
+            <a:off x="276639" y="599122"/>
+            <a:ext cx="8608944" cy="5592672"/>
+          </a:xfrm>
+        </p:spPr>
+        <p:txBody>
+          <a:bodyPr>
+            <a:normAutofit/>
+          </a:bodyPr>
+          <a:lstStyle/>
+          <a:p>
+            <a:pPr>
+              <a:buSzPts val="2400"/>
+            </a:pPr>
+            <a:r>
+              <a:rPr lang="en-US" sz="2000" i="1" dirty="0">
+                <a:solidFill>
+                  <a:srgbClr val="000000"/>
+                </a:solidFill>
+              </a:rPr>
+              <a:t>HTML5 (including JavaScript, CSS3, SVG, etc.)</a:t>
+            </a:r>
+          </a:p>
+          <a:p>
+            <a:pPr lvl="1">
+              <a:buSzPts val="2000"/>
+            </a:pPr>
+            <a:r>
+              <a:rPr lang="en-US" i="1" u="sng" dirty="0">
+                <a:solidFill>
+                  <a:srgbClr val="005CA5"/>
+                </a:solidFill>
+              </a:rPr>
+              <a:t>https://en.wikipedia.org/wiki/HTML5</a:t>
+            </a:r>
+            <a:r>
+              <a:rPr lang="en-US" i="1" dirty="0">
+                <a:solidFill>
+                  <a:srgbClr val="005CA5"/>
+                </a:solidFill>
+              </a:rPr>
+              <a:t> </a:t>
+            </a:r>
+          </a:p>
+          <a:p>
+            <a:pPr lvl="2"/>
+            <a:endParaRPr lang="en-US" i="1" dirty="0">
+              <a:solidFill>
+                <a:srgbClr val="005CA5"/>
+              </a:solidFill>
+            </a:endParaRPr>
+          </a:p>
+          <a:p>
+            <a:pPr>
+              <a:buSzPts val="2400"/>
+            </a:pPr>
+            <a:r>
+              <a:rPr lang="en-US" sz="2000" i="1" dirty="0">
+                <a:solidFill>
+                  <a:srgbClr val="000000"/>
+                </a:solidFill>
+              </a:rPr>
+              <a:t>Bootstrap,     </a:t>
+            </a:r>
+            <a:r>
+              <a:rPr lang="en-US" i="1" dirty="0">
+                <a:solidFill>
+                  <a:srgbClr val="000000"/>
+                </a:solidFill>
+                <a:hlinkClick r:id="rId3"/>
+              </a:rPr>
+              <a:t>http://getbootstrap.com</a:t>
+            </a:r>
+            <a:r>
+              <a:rPr lang="en-US" i="1" dirty="0">
+                <a:solidFill>
+                  <a:srgbClr val="000000"/>
+                </a:solidFill>
+              </a:rPr>
+              <a:t> </a:t>
+            </a:r>
+            <a:endParaRPr lang="en-US" sz="2000" i="1" dirty="0">
+              <a:solidFill>
+                <a:srgbClr val="000000"/>
+              </a:solidFill>
+            </a:endParaRPr>
+          </a:p>
+          <a:p>
+            <a:pPr lvl="1">
+              <a:buSzPts val="2000"/>
+            </a:pPr>
+            <a:r>
+              <a:rPr lang="en-US" i="1" dirty="0">
+                <a:solidFill>
+                  <a:srgbClr val="005CA5"/>
+                </a:solidFill>
+              </a:rPr>
+              <a:t>fundamental for cross-platform web applications</a:t>
+            </a:r>
+          </a:p>
+          <a:p>
+            <a:pPr lvl="2"/>
+            <a:endParaRPr lang="en-US" i="1" dirty="0">
+              <a:solidFill>
+                <a:srgbClr val="005CA5"/>
+              </a:solidFill>
+            </a:endParaRPr>
+          </a:p>
+          <a:p>
+            <a:pPr>
+              <a:buSzPts val="2400"/>
+            </a:pPr>
+            <a:r>
+              <a:rPr lang="en-US" sz="2000" i="1" dirty="0">
+                <a:solidFill>
+                  <a:srgbClr val="000000"/>
+                </a:solidFill>
+              </a:rPr>
+              <a:t>AngularJS,    </a:t>
+            </a:r>
+            <a:r>
+              <a:rPr lang="en-US" sz="2000" i="1" dirty="0">
+                <a:solidFill>
+                  <a:srgbClr val="000000"/>
+                </a:solidFill>
+                <a:hlinkClick r:id="rId4"/>
+              </a:rPr>
+              <a:t>https://angularjs.org</a:t>
+            </a:r>
+            <a:r>
+              <a:rPr lang="en-US" sz="2000" i="1" dirty="0">
+                <a:solidFill>
+                  <a:srgbClr val="000000"/>
+                </a:solidFill>
+              </a:rPr>
+              <a:t> </a:t>
+            </a:r>
+          </a:p>
+          <a:p>
+            <a:pPr lvl="1">
+              <a:buSzPts val="2000"/>
+            </a:pPr>
+            <a:r>
+              <a:rPr lang="en-US" i="1" dirty="0">
+                <a:solidFill>
+                  <a:srgbClr val="005CA5"/>
+                </a:solidFill>
+              </a:rPr>
+              <a:t>model–view–whatever (MV *) architecture, components</a:t>
+            </a:r>
+          </a:p>
+          <a:p>
+            <a:pPr lvl="2"/>
+            <a:endParaRPr lang="en-US" i="1" dirty="0">
+              <a:solidFill>
+                <a:srgbClr val="005CA5"/>
+              </a:solidFill>
+            </a:endParaRPr>
+          </a:p>
+          <a:p>
+            <a:pPr>
+              <a:buSzPts val="2400"/>
+            </a:pPr>
+            <a:r>
+              <a:rPr lang="nl-NL" sz="2000" i="1" dirty="0">
+                <a:solidFill>
+                  <a:srgbClr val="000000"/>
+                </a:solidFill>
+              </a:rPr>
+              <a:t>D3.js,             </a:t>
+            </a:r>
+            <a:r>
+              <a:rPr lang="nl-NL" sz="2000" i="1" dirty="0">
+                <a:solidFill>
+                  <a:srgbClr val="000000"/>
+                </a:solidFill>
+                <a:hlinkClick r:id="rId5"/>
+              </a:rPr>
+              <a:t>http://d3js.org</a:t>
+            </a:r>
+            <a:r>
+              <a:rPr lang="nl-NL" sz="2000" i="1" dirty="0">
+                <a:solidFill>
+                  <a:srgbClr val="000000"/>
+                </a:solidFill>
+              </a:rPr>
+              <a:t> </a:t>
+            </a:r>
+          </a:p>
+          <a:p>
+            <a:pPr lvl="1">
+              <a:buSzPts val="2000"/>
+            </a:pPr>
+            <a:r>
+              <a:rPr lang="en-US" i="1" dirty="0">
+                <a:solidFill>
+                  <a:srgbClr val="005CA5"/>
+                </a:solidFill>
+              </a:rPr>
+              <a:t>interactive plots, data-driven transformations</a:t>
+            </a:r>
+          </a:p>
+          <a:p>
+            <a:pPr lvl="2"/>
+            <a:endParaRPr lang="en-US" i="1" dirty="0">
+              <a:solidFill>
+                <a:srgbClr val="005CA5"/>
+              </a:solidFill>
+            </a:endParaRPr>
+          </a:p>
+          <a:p>
+            <a:pPr>
+              <a:buSzPts val="2400"/>
+            </a:pPr>
+            <a:r>
+              <a:rPr lang="fi-FI" sz="2000" i="1" dirty="0">
+                <a:solidFill>
+                  <a:srgbClr val="000000"/>
+                </a:solidFill>
+              </a:rPr>
+              <a:t>Karma,         </a:t>
+            </a:r>
+            <a:r>
+              <a:rPr lang="fi-FI" sz="2000" i="1" dirty="0">
+                <a:solidFill>
+                  <a:srgbClr val="000000"/>
+                </a:solidFill>
+                <a:hlinkClick r:id="rId6"/>
+              </a:rPr>
+              <a:t>http://karma-runner.github.io</a:t>
+            </a:r>
+            <a:r>
+              <a:rPr lang="fi-FI" sz="2000" i="1" dirty="0">
+                <a:solidFill>
+                  <a:srgbClr val="000000"/>
+                </a:solidFill>
+              </a:rPr>
+              <a:t> </a:t>
+            </a:r>
+          </a:p>
+          <a:p>
+            <a:pPr lvl="1">
+              <a:buSzPts val="2000"/>
+            </a:pPr>
+            <a:r>
+              <a:rPr lang="en-US" i="1" dirty="0">
+                <a:solidFill>
+                  <a:srgbClr val="005CA5"/>
+                </a:solidFill>
+              </a:rPr>
+              <a:t>testing framework for browser-based applications</a:t>
+            </a:r>
+          </a:p>
+          <a:p>
+            <a:pPr lvl="3">
+              <a:buSzPts val="2000"/>
+            </a:pPr>
+            <a:endParaRPr lang="en-US" i="1" dirty="0"/>
+          </a:p>
+          <a:p>
+            <a:pPr>
+              <a:buSzPts val="2000"/>
+            </a:pPr>
+            <a:r>
+              <a:rPr lang="en-US" i="1" dirty="0"/>
+              <a:t>JSON,             </a:t>
+            </a:r>
+            <a:r>
+              <a:rPr lang="en-US" i="1" dirty="0">
+                <a:hlinkClick r:id="rId7"/>
+              </a:rPr>
+              <a:t>https://www.w3schools.com/js/js_json.asp</a:t>
+            </a:r>
+            <a:r>
+              <a:rPr lang="en-US" i="1" dirty="0"/>
+              <a:t> </a:t>
+            </a:r>
+          </a:p>
+          <a:p>
+            <a:pPr lvl="1">
+              <a:buSzPts val="2000"/>
+            </a:pPr>
+            <a:r>
+              <a:rPr lang="en-US" i="1" dirty="0">
+                <a:solidFill>
+                  <a:srgbClr val="005CA5"/>
+                </a:solidFill>
+              </a:rPr>
+              <a:t>JavaScript Object Notation – lightweight data-interchange format</a:t>
+            </a:r>
+          </a:p>
+        </p:txBody>
+      </p:sp>
+    </p:spTree>
+    <p:extLst>
+      <p:ext uri="{BB962C8B-B14F-4D97-AF65-F5344CB8AC3E}">
+        <p14:creationId xmlns:p14="http://schemas.microsoft.com/office/powerpoint/2010/main" val="441908759"/>
+      </p:ext>
+    </p:extLst>
+  </p:cSld>
+  <p:clrMapOvr>
+    <a:masterClrMapping/>
+  </p:clrMapOvr>
+</p:sld>
+</file>
+
+<file path=ppt/slides/slide12.xml><?xml version="1.0" encoding="utf-8"?>
+<p:sld xmlns:a="http://schemas.openxmlformats.org/drawingml/2006/main" xmlns:r="http://schemas.openxmlformats.org/officeDocument/2006/relationships" xmlns:p="http://schemas.openxmlformats.org/presentationml/2006/main">
+  <p:cSld>
+    <p:spTree>
+      <p:nvGrpSpPr>
+        <p:cNvPr id="1" name=""/>
+        <p:cNvGrpSpPr/>
+        <p:nvPr/>
+      </p:nvGrpSpPr>
+      <p:grpSpPr>
+        <a:xfrm>
+          <a:off x="0" y="0"/>
+          <a:ext cx="0" cy="0"/>
+          <a:chOff x="0" y="0"/>
+          <a:chExt cx="0" cy="0"/>
+        </a:xfrm>
+      </p:grpSpPr>
+      <p:sp>
+        <p:nvSpPr>
+          <p:cNvPr id="2" name="Title 1"/>
+          <p:cNvSpPr>
+            <a:spLocks noGrp="1"/>
+          </p:cNvSpPr>
+          <p:nvPr>
+            <p:ph type="title"/>
+          </p:nvPr>
+        </p:nvSpPr>
+        <p:spPr>
+          <a:xfrm>
+            <a:off x="0" y="10037"/>
+            <a:ext cx="9144000" cy="589085"/>
+          </a:xfrm>
+        </p:spPr>
+        <p:txBody>
+          <a:bodyPr>
+            <a:normAutofit/>
+          </a:bodyPr>
+          <a:lstStyle/>
+          <a:p>
+            <a:r>
+              <a:rPr lang="en-US" dirty="0"/>
+              <a:t>Sirepo:  server-side technologies</a:t>
+            </a:r>
+          </a:p>
+        </p:txBody>
+      </p:sp>
+      <p:sp>
+        <p:nvSpPr>
+          <p:cNvPr id="3" name="Content Placeholder 2"/>
+          <p:cNvSpPr>
+            <a:spLocks noGrp="1"/>
+          </p:cNvSpPr>
+          <p:nvPr>
+            <p:ph idx="1"/>
+          </p:nvPr>
+        </p:nvSpPr>
+        <p:spPr>
+          <a:xfrm>
+            <a:off x="276639" y="599122"/>
+            <a:ext cx="8608944" cy="5592672"/>
+          </a:xfrm>
+        </p:spPr>
+        <p:txBody>
+          <a:bodyPr>
+            <a:normAutofit/>
+          </a:bodyPr>
+          <a:lstStyle/>
+          <a:p>
+            <a:pPr>
+              <a:buSzPts val="2000"/>
+            </a:pPr>
+            <a:r>
+              <a:rPr lang="en-US" i="1" dirty="0"/>
+              <a:t>Docker         </a:t>
+            </a:r>
+            <a:r>
+              <a:rPr lang="en-US" i="1" dirty="0">
+                <a:hlinkClick r:id="rId3"/>
+              </a:rPr>
+              <a:t>https://www.docker.com</a:t>
+            </a:r>
+            <a:r>
+              <a:rPr lang="en-US" i="1" dirty="0"/>
+              <a:t> </a:t>
+            </a:r>
+          </a:p>
+          <a:p>
+            <a:pPr lvl="1">
+              <a:buSzPts val="2000"/>
+            </a:pPr>
+            <a:r>
+              <a:rPr lang="en-US" i="1" dirty="0"/>
+              <a:t>enables rapid deployment of applications to the cloud</a:t>
+            </a:r>
+          </a:p>
+          <a:p>
+            <a:pPr>
+              <a:buSzPts val="2000"/>
+            </a:pPr>
+            <a:r>
+              <a:rPr lang="en-US" i="1" dirty="0"/>
+              <a:t>Flask             </a:t>
+            </a:r>
+            <a:r>
+              <a:rPr lang="en-US" i="1" dirty="0">
+                <a:hlinkClick r:id="rId4"/>
+              </a:rPr>
+              <a:t>http://flask.pocoo.org</a:t>
+            </a:r>
+            <a:r>
+              <a:rPr lang="en-US" i="1" dirty="0"/>
+              <a:t> </a:t>
+            </a:r>
+          </a:p>
+          <a:p>
+            <a:pPr lvl="1">
+              <a:buSzPts val="2000"/>
+            </a:pPr>
+            <a:r>
+              <a:rPr lang="en-US" i="1" dirty="0"/>
+              <a:t>lightweight framework for web development with Python</a:t>
+            </a:r>
+          </a:p>
+          <a:p>
+            <a:pPr>
+              <a:buSzPts val="2000"/>
+            </a:pPr>
+            <a:r>
+              <a:rPr lang="en-US" i="1" dirty="0"/>
+              <a:t>Celery          </a:t>
+            </a:r>
+            <a:r>
+              <a:rPr lang="en-US" i="1" dirty="0">
+                <a:hlinkClick r:id="rId5"/>
+              </a:rPr>
+              <a:t>http://docs.celeryproject.org</a:t>
+            </a:r>
+            <a:r>
+              <a:rPr lang="en-US" i="1" dirty="0"/>
+              <a:t> </a:t>
+            </a:r>
+          </a:p>
+          <a:p>
+            <a:pPr lvl="1">
+              <a:buSzPts val="2000"/>
+            </a:pPr>
+            <a:r>
+              <a:rPr lang="en-US" i="1" dirty="0"/>
+              <a:t>task manager</a:t>
+            </a:r>
+          </a:p>
+          <a:p>
+            <a:pPr>
+              <a:buSzPts val="2000"/>
+            </a:pPr>
+            <a:r>
+              <a:rPr lang="en-US" i="1" dirty="0"/>
+              <a:t>RabbitMQ    </a:t>
+            </a:r>
+            <a:r>
+              <a:rPr lang="en-US" i="1" dirty="0">
+                <a:hlinkClick r:id="rId6"/>
+              </a:rPr>
+              <a:t>https://www.rabbitmq.com</a:t>
+            </a:r>
+            <a:r>
+              <a:rPr lang="en-US" i="1" dirty="0"/>
+              <a:t> </a:t>
+            </a:r>
+          </a:p>
+          <a:p>
+            <a:pPr lvl="1">
+              <a:buSzPts val="2000"/>
+            </a:pPr>
+            <a:r>
+              <a:rPr lang="en-US" i="1" dirty="0"/>
+              <a:t>message broker</a:t>
+            </a:r>
+          </a:p>
+          <a:p>
+            <a:pPr>
+              <a:buSzPts val="2000"/>
+            </a:pPr>
+            <a:r>
+              <a:rPr lang="en-US" i="1" dirty="0"/>
+              <a:t>Jinja             </a:t>
+            </a:r>
+            <a:r>
+              <a:rPr lang="en-US" i="1" dirty="0">
+                <a:hlinkClick r:id="rId7"/>
+              </a:rPr>
+              <a:t>http://jinja.pocoo.org/docs/dev</a:t>
+            </a:r>
+            <a:r>
+              <a:rPr lang="en-US" i="1" dirty="0"/>
+              <a:t> </a:t>
+            </a:r>
+          </a:p>
+          <a:p>
+            <a:pPr lvl="1">
+              <a:buSzPts val="2000"/>
+            </a:pPr>
+            <a:r>
+              <a:rPr lang="en-US" i="1" dirty="0"/>
+              <a:t>secure and widely used templating language for Python</a:t>
+            </a:r>
+          </a:p>
+          <a:p>
+            <a:pPr>
+              <a:buSzPts val="2000"/>
+            </a:pPr>
+            <a:r>
+              <a:rPr lang="en-US" i="1" dirty="0"/>
+              <a:t>Werkzeug    </a:t>
+            </a:r>
+            <a:r>
+              <a:rPr lang="en-US" i="1" dirty="0">
+                <a:hlinkClick r:id="rId8"/>
+              </a:rPr>
+              <a:t>http://werkzeug.pocoo.org/docs/0.10</a:t>
+            </a:r>
+            <a:r>
+              <a:rPr lang="en-US" i="1" dirty="0"/>
+              <a:t> </a:t>
+            </a:r>
+          </a:p>
+          <a:p>
+            <a:pPr lvl="1">
+              <a:buSzPts val="2000"/>
+            </a:pPr>
+            <a:r>
+              <a:rPr lang="en-US" i="1" dirty="0"/>
+              <a:t>Python utility library, compliant with the WSGI standard</a:t>
+            </a:r>
+          </a:p>
+          <a:p>
+            <a:pPr>
+              <a:buSzPts val="2000"/>
+            </a:pPr>
+            <a:r>
+              <a:rPr lang="en-US" i="1" dirty="0"/>
+              <a:t>Nginx           </a:t>
+            </a:r>
+            <a:r>
+              <a:rPr lang="en-US" i="1" dirty="0">
+                <a:hlinkClick r:id="rId9"/>
+              </a:rPr>
+              <a:t>https://www.nginx.com/resources/wiki</a:t>
+            </a:r>
+            <a:r>
+              <a:rPr lang="en-US" i="1" dirty="0"/>
+              <a:t> </a:t>
+            </a:r>
+          </a:p>
+          <a:p>
+            <a:pPr lvl="1">
+              <a:buSzPts val="2000"/>
+            </a:pPr>
+            <a:r>
+              <a:rPr lang="en-US" i="1" dirty="0"/>
+              <a:t>HTTP server &amp; proxy; scalable event-driven architecture</a:t>
+            </a:r>
+          </a:p>
+          <a:p>
+            <a:pPr>
+              <a:buSzPts val="2000"/>
+            </a:pPr>
+            <a:r>
+              <a:rPr lang="en-US" i="1" dirty="0"/>
+              <a:t>Pyenv          </a:t>
+            </a:r>
+            <a:r>
+              <a:rPr lang="en-US" i="1" dirty="0">
+                <a:hlinkClick r:id="rId10"/>
+              </a:rPr>
+              <a:t>https://github.com/yyuu/pyenv</a:t>
+            </a:r>
+            <a:r>
+              <a:rPr lang="en-US" i="1" dirty="0"/>
+              <a:t> </a:t>
+            </a:r>
+          </a:p>
+          <a:p>
+            <a:pPr lvl="1">
+              <a:buSzPts val="2000"/>
+            </a:pPr>
+            <a:r>
+              <a:rPr lang="en-US" i="1" dirty="0"/>
+              <a:t>Python version management, multiple versions</a:t>
+            </a:r>
+          </a:p>
+          <a:p>
+            <a:pPr lvl="1">
+              <a:buSzPts val="2000"/>
+            </a:pPr>
+            <a:endParaRPr lang="en-US" i="1" dirty="0">
+              <a:solidFill>
+                <a:srgbClr val="005CA5"/>
+              </a:solidFill>
+            </a:endParaRPr>
+          </a:p>
+        </p:txBody>
+      </p:sp>
+    </p:spTree>
+    <p:extLst>
+      <p:ext uri="{BB962C8B-B14F-4D97-AF65-F5344CB8AC3E}">
+        <p14:creationId xmlns:p14="http://schemas.microsoft.com/office/powerpoint/2010/main" val="936142585"/>
+      </p:ext>
+    </p:extLst>
+  </p:cSld>
+  <p:clrMapOvr>
+    <a:masterClrMapping/>
+  </p:clrMapOvr>
+</p:sld>
+</file>
+
+<file path=ppt/slides/slide13.xml><?xml version="1.0" encoding="utf-8"?>
+<p:sld xmlns:a="http://schemas.openxmlformats.org/drawingml/2006/main" xmlns:r="http://schemas.openxmlformats.org/officeDocument/2006/relationships" xmlns:p="http://schemas.openxmlformats.org/presentationml/2006/main">
+  <p:cSld>
+    <p:spTree>
+      <p:nvGrpSpPr>
+        <p:cNvPr id="1" name=""/>
+        <p:cNvGrpSpPr/>
+        <p:nvPr/>
+      </p:nvGrpSpPr>
+      <p:grpSpPr>
+        <a:xfrm>
+          <a:off x="0" y="0"/>
+          <a:ext cx="0" cy="0"/>
+          <a:chOff x="0" y="0"/>
+          <a:chExt cx="0" cy="0"/>
+        </a:xfrm>
+      </p:grpSpPr>
+      <p:sp>
+        <p:nvSpPr>
+          <p:cNvPr id="2" name="Title 1"/>
+          <p:cNvSpPr>
+            <a:spLocks noGrp="1"/>
+          </p:cNvSpPr>
+          <p:nvPr>
+            <p:ph type="title"/>
+          </p:nvPr>
+        </p:nvSpPr>
+        <p:spPr>
+          <a:xfrm>
+            <a:off x="0" y="140672"/>
+            <a:ext cx="9144000" cy="589085"/>
+          </a:xfrm>
+        </p:spPr>
+        <p:txBody>
+          <a:bodyPr>
+            <a:normAutofit/>
+          </a:bodyPr>
+          <a:lstStyle/>
+          <a:p>
+            <a:r>
+              <a:rPr lang="en-US" dirty="0"/>
+              <a:t>Class discussion:</a:t>
+            </a:r>
+          </a:p>
+        </p:txBody>
+      </p:sp>
+      <p:sp>
+        <p:nvSpPr>
+          <p:cNvPr id="6" name="Content Placeholder 2">
+            <a:extLst>
+              <a:ext uri="{FF2B5EF4-FFF2-40B4-BE49-F238E27FC236}">
+                <a16:creationId xmlns:a16="http://schemas.microsoft.com/office/drawing/2014/main" id="{9081FF26-7AD5-4767-AF65-A27F1769E1FC}"/>
+              </a:ext>
+            </a:extLst>
+          </p:cNvPr>
+          <p:cNvSpPr>
+            <a:spLocks noGrp="1"/>
+          </p:cNvSpPr>
+          <p:nvPr>
+            <p:ph idx="1"/>
+          </p:nvPr>
+        </p:nvSpPr>
+        <p:spPr>
+          <a:xfrm>
+            <a:off x="322216" y="827314"/>
+            <a:ext cx="8669383" cy="5364480"/>
+          </a:xfrm>
+        </p:spPr>
+        <p:txBody>
+          <a:bodyPr>
+            <a:normAutofit/>
+          </a:bodyPr>
+          <a:lstStyle/>
+          <a:p>
+            <a:r>
+              <a:rPr lang="en-US" sz="1800" i="0" dirty="0"/>
+              <a:t>Any questions at this point?</a:t>
+            </a:r>
+          </a:p>
+          <a:p>
+            <a:pPr lvl="1"/>
+            <a:endParaRPr lang="en-US" i="0" dirty="0"/>
+          </a:p>
+          <a:p>
+            <a:r>
+              <a:rPr lang="en-US" dirty="0"/>
+              <a:t>How does cloud computing help with ease of use?</a:t>
+            </a:r>
+          </a:p>
+          <a:p>
+            <a:pPr lvl="1"/>
+            <a:endParaRPr lang="en-US" dirty="0"/>
+          </a:p>
+          <a:p>
+            <a:r>
+              <a:rPr lang="en-US" dirty="0"/>
+              <a:t>How does cloud computing help with software sustainability?</a:t>
+            </a:r>
+          </a:p>
+          <a:p>
+            <a:endParaRPr lang="en-US" dirty="0"/>
+          </a:p>
+          <a:p>
+            <a:pPr marL="0" indent="0">
+              <a:buNone/>
+            </a:pPr>
+            <a:endParaRPr lang="en-US" dirty="0"/>
+          </a:p>
+        </p:txBody>
+      </p:sp>
+    </p:spTree>
+    <p:extLst>
+      <p:ext uri="{BB962C8B-B14F-4D97-AF65-F5344CB8AC3E}">
+        <p14:creationId xmlns:p14="http://schemas.microsoft.com/office/powerpoint/2010/main" val="150555758"/>
+      </p:ext>
+    </p:extLst>
+  </p:cSld>
+  <p:clrMapOvr>
+    <a:masterClrMapping/>
+  </p:clrMapOvr>
+</p:sld>
+</file>
+
+<file path=ppt/slides/slide14.xml><?xml version="1.0" encoding="utf-8"?>
+<p:sld xmlns:a="http://schemas.openxmlformats.org/drawingml/2006/main" xmlns:r="http://schemas.openxmlformats.org/officeDocument/2006/relationships" xmlns:p="http://schemas.openxmlformats.org/presentationml/2006/main">
+  <p:cSld>
+    <p:spTree>
+      <p:nvGrpSpPr>
+        <p:cNvPr id="1" name=""/>
+        <p:cNvGrpSpPr/>
+        <p:nvPr/>
+      </p:nvGrpSpPr>
+      <p:grpSpPr>
+        <a:xfrm>
+          <a:off x="0" y="0"/>
+          <a:ext cx="0" cy="0"/>
+          <a:chOff x="0" y="0"/>
+          <a:chExt cx="0" cy="0"/>
+        </a:xfrm>
+      </p:grpSpPr>
+      <p:sp>
+        <p:nvSpPr>
+          <p:cNvPr id="2" name="Title 1"/>
+          <p:cNvSpPr>
+            <a:spLocks noGrp="1"/>
+          </p:cNvSpPr>
+          <p:nvPr>
+            <p:ph type="title"/>
+          </p:nvPr>
+        </p:nvSpPr>
+        <p:spPr>
+          <a:xfrm>
+            <a:off x="0" y="10037"/>
+            <a:ext cx="9144000" cy="589085"/>
+          </a:xfrm>
+        </p:spPr>
+        <p:txBody>
+          <a:bodyPr>
+            <a:normAutofit/>
+          </a:bodyPr>
+          <a:lstStyle/>
+          <a:p>
+            <a:r>
+              <a:rPr lang="en-US" dirty="0"/>
+              <a:t>The elegant code</a:t>
+            </a:r>
+          </a:p>
+        </p:txBody>
+      </p:sp>
+      <p:sp>
+        <p:nvSpPr>
+          <p:cNvPr id="3" name="Content Placeholder 2"/>
+          <p:cNvSpPr>
+            <a:spLocks noGrp="1"/>
+          </p:cNvSpPr>
+          <p:nvPr>
+            <p:ph idx="1"/>
+          </p:nvPr>
+        </p:nvSpPr>
+        <p:spPr>
+          <a:xfrm>
+            <a:off x="276639" y="775063"/>
+            <a:ext cx="8608944" cy="5521232"/>
+          </a:xfrm>
+        </p:spPr>
+        <p:txBody>
+          <a:bodyPr>
+            <a:normAutofit/>
+          </a:bodyPr>
+          <a:lstStyle/>
+          <a:p>
+            <a:r>
+              <a:rPr lang="en-US" dirty="0"/>
+              <a:t>G</a:t>
+            </a:r>
+          </a:p>
+        </p:txBody>
+      </p:sp>
+    </p:spTree>
+    <p:extLst>
+      <p:ext uri="{BB962C8B-B14F-4D97-AF65-F5344CB8AC3E}">
+        <p14:creationId xmlns:p14="http://schemas.microsoft.com/office/powerpoint/2010/main" val="3655185164"/>
+      </p:ext>
+    </p:extLst>
+  </p:cSld>
+  <p:clrMapOvr>
+    <a:masterClrMapping/>
+  </p:clrMapOvr>
+</p:sld>
+</file>
+
+<file path=ppt/slides/slide15.xml><?xml version="1.0" encoding="utf-8"?>
 <p:sld xmlns:a="http://schemas.openxmlformats.org/drawingml/2006/main" xmlns:r="http://schemas.openxmlformats.org/officeDocument/2006/relationships" xmlns:p="http://schemas.openxmlformats.org/presentationml/2006/main">
   <p:cSld>
     <p:spTree>

</xml_diff>